<commit_message>
cambios en la app
</commit_message>
<xml_diff>
--- a/Referencias/diagramas/diagrama_flujo_stent_inteligente.pptx
+++ b/Referencias/diagramas/diagrama_flujo_stent_inteligente.pptx
@@ -3378,16 +3378,16 @@
         </p:spPr>
         <p:style>
           <a:lnRef idx="1">
-            <a:schemeClr val="accent6"/>
+            <a:schemeClr val="accent3"/>
           </a:lnRef>
-          <a:fillRef idx="3">
-            <a:schemeClr val="accent6"/>
+          <a:fillRef idx="2">
+            <a:schemeClr val="accent3"/>
           </a:fillRef>
-          <a:effectRef idx="2">
-            <a:schemeClr val="accent6"/>
+          <a:effectRef idx="1">
+            <a:schemeClr val="accent3"/>
           </a:effectRef>
           <a:fontRef idx="minor">
-            <a:schemeClr val="lt1"/>
+            <a:schemeClr val="dk1"/>
           </a:fontRef>
         </p:style>
         <p:txBody>
@@ -3841,16 +3841,16 @@
         </p:spPr>
         <p:style>
           <a:lnRef idx="1">
-            <a:schemeClr val="accent6"/>
+            <a:schemeClr val="accent3"/>
           </a:lnRef>
-          <a:fillRef idx="3">
-            <a:schemeClr val="accent6"/>
+          <a:fillRef idx="2">
+            <a:schemeClr val="accent3"/>
           </a:fillRef>
-          <a:effectRef idx="2">
-            <a:schemeClr val="accent6"/>
+          <a:effectRef idx="1">
+            <a:schemeClr val="accent3"/>
           </a:effectRef>
           <a:fontRef idx="minor">
-            <a:schemeClr val="lt1"/>
+            <a:schemeClr val="dk1"/>
           </a:fontRef>
         </p:style>
         <p:txBody>

</xml_diff>